<commit_message>
finished up lab 6 with part 8 bonus
</commit_message>
<xml_diff>
--- a/Lab_6_outline_slides.pptx
+++ b/Lab_6_outline_slides.pptx
@@ -12,6 +12,7 @@
     <p:sldId id="257" r:id="rId6"/>
     <p:sldId id="258" r:id="rId7"/>
     <p:sldId id="259" r:id="rId8"/>
+    <p:sldId id="263" r:id="rId9"/>
   </p:sldIdLst>
   <p:sldSz cx="12192000" cy="6858000"/>
   <p:notesSz cx="6858000" cy="9144000"/>
@@ -249,7 +250,7 @@
           <a:p>
             <a:fld id="{85BE7A37-41B3-4756-82C6-3330A0E6FE21}" type="datetimeFigureOut">
               <a:rPr lang="en-US" smtClean="0"/>
-              <a:t>5/6/2020</a:t>
+              <a:t>5/7/2020</a:t>
             </a:fld>
             <a:endParaRPr lang="en-US"/>
           </a:p>
@@ -419,7 +420,7 @@
           <a:p>
             <a:fld id="{85BE7A37-41B3-4756-82C6-3330A0E6FE21}" type="datetimeFigureOut">
               <a:rPr lang="en-US" smtClean="0"/>
-              <a:t>5/6/2020</a:t>
+              <a:t>5/7/2020</a:t>
             </a:fld>
             <a:endParaRPr lang="en-US"/>
           </a:p>
@@ -599,7 +600,7 @@
           <a:p>
             <a:fld id="{85BE7A37-41B3-4756-82C6-3330A0E6FE21}" type="datetimeFigureOut">
               <a:rPr lang="en-US" smtClean="0"/>
-              <a:t>5/6/2020</a:t>
+              <a:t>5/7/2020</a:t>
             </a:fld>
             <a:endParaRPr lang="en-US"/>
           </a:p>
@@ -769,7 +770,7 @@
           <a:p>
             <a:fld id="{85BE7A37-41B3-4756-82C6-3330A0E6FE21}" type="datetimeFigureOut">
               <a:rPr lang="en-US" smtClean="0"/>
-              <a:t>5/6/2020</a:t>
+              <a:t>5/7/2020</a:t>
             </a:fld>
             <a:endParaRPr lang="en-US"/>
           </a:p>
@@ -1015,7 +1016,7 @@
           <a:p>
             <a:fld id="{85BE7A37-41B3-4756-82C6-3330A0E6FE21}" type="datetimeFigureOut">
               <a:rPr lang="en-US" smtClean="0"/>
-              <a:t>5/6/2020</a:t>
+              <a:t>5/7/2020</a:t>
             </a:fld>
             <a:endParaRPr lang="en-US"/>
           </a:p>
@@ -1247,7 +1248,7 @@
           <a:p>
             <a:fld id="{85BE7A37-41B3-4756-82C6-3330A0E6FE21}" type="datetimeFigureOut">
               <a:rPr lang="en-US" smtClean="0"/>
-              <a:t>5/6/2020</a:t>
+              <a:t>5/7/2020</a:t>
             </a:fld>
             <a:endParaRPr lang="en-US"/>
           </a:p>
@@ -1614,7 +1615,7 @@
           <a:p>
             <a:fld id="{85BE7A37-41B3-4756-82C6-3330A0E6FE21}" type="datetimeFigureOut">
               <a:rPr lang="en-US" smtClean="0"/>
-              <a:t>5/6/2020</a:t>
+              <a:t>5/7/2020</a:t>
             </a:fld>
             <a:endParaRPr lang="en-US"/>
           </a:p>
@@ -1732,7 +1733,7 @@
           <a:p>
             <a:fld id="{85BE7A37-41B3-4756-82C6-3330A0E6FE21}" type="datetimeFigureOut">
               <a:rPr lang="en-US" smtClean="0"/>
-              <a:t>5/6/2020</a:t>
+              <a:t>5/7/2020</a:t>
             </a:fld>
             <a:endParaRPr lang="en-US"/>
           </a:p>
@@ -1827,7 +1828,7 @@
           <a:p>
             <a:fld id="{85BE7A37-41B3-4756-82C6-3330A0E6FE21}" type="datetimeFigureOut">
               <a:rPr lang="en-US" smtClean="0"/>
-              <a:t>5/6/2020</a:t>
+              <a:t>5/7/2020</a:t>
             </a:fld>
             <a:endParaRPr lang="en-US"/>
           </a:p>
@@ -2104,7 +2105,7 @@
           <a:p>
             <a:fld id="{85BE7A37-41B3-4756-82C6-3330A0E6FE21}" type="datetimeFigureOut">
               <a:rPr lang="en-US" smtClean="0"/>
-              <a:t>5/6/2020</a:t>
+              <a:t>5/7/2020</a:t>
             </a:fld>
             <a:endParaRPr lang="en-US"/>
           </a:p>
@@ -2357,7 +2358,7 @@
           <a:p>
             <a:fld id="{85BE7A37-41B3-4756-82C6-3330A0E6FE21}" type="datetimeFigureOut">
               <a:rPr lang="en-US" smtClean="0"/>
-              <a:t>5/6/2020</a:t>
+              <a:t>5/7/2020</a:t>
             </a:fld>
             <a:endParaRPr lang="en-US"/>
           </a:p>
@@ -2570,7 +2571,7 @@
           <a:p>
             <a:fld id="{85BE7A37-41B3-4756-82C6-3330A0E6FE21}" type="datetimeFigureOut">
               <a:rPr lang="en-US" smtClean="0"/>
-              <a:t>5/6/2020</a:t>
+              <a:t>5/7/2020</a:t>
             </a:fld>
             <a:endParaRPr lang="en-US"/>
           </a:p>
@@ -3017,11 +3018,7 @@
           <a:p>
             <a:r>
               <a:rPr lang="en-US" sz="3600" dirty="0" smtClean="0"/>
-              <a:t>Part </a:t>
-            </a:r>
-            <a:r>
-              <a:rPr lang="en-US" sz="3600" dirty="0" smtClean="0"/>
-              <a:t>1: Overview and importing the data</a:t>
+              <a:t>Part 1: Overview and importing the data</a:t>
             </a:r>
             <a:endParaRPr lang="en-US" sz="3600" dirty="0"/>
           </a:p>
@@ -3099,19 +3096,7 @@
           <a:p>
             <a:r>
               <a:rPr lang="en-US" sz="3600" dirty="0" smtClean="0"/>
-              <a:t>Part </a:t>
-            </a:r>
-            <a:r>
-              <a:rPr lang="en-US" sz="3600" dirty="0" smtClean="0"/>
-              <a:t>2: </a:t>
-            </a:r>
-            <a:r>
-              <a:rPr lang="en-US" sz="3600" dirty="0" smtClean="0"/>
-              <a:t>Find </a:t>
-            </a:r>
-            <a:r>
-              <a:rPr lang="en-US" sz="3600" dirty="0" smtClean="0"/>
-              <a:t>Stress and Strain</a:t>
+              <a:t>Part 2: Find Stress and Strain</a:t>
             </a:r>
             <a:endParaRPr lang="en-US" sz="3600" dirty="0"/>
           </a:p>
@@ -3189,11 +3174,7 @@
           <a:p>
             <a:r>
               <a:rPr lang="en-US" sz="3600" dirty="0" smtClean="0"/>
-              <a:t>Part </a:t>
-            </a:r>
-            <a:r>
-              <a:rPr lang="en-US" sz="3600" dirty="0" smtClean="0"/>
-              <a:t>3: Plot Stress Strain Curves</a:t>
+              <a:t>Part 3: Plot Stress Strain Curves</a:t>
             </a:r>
             <a:endParaRPr lang="en-US" sz="3600" dirty="0"/>
           </a:p>
@@ -3504,13 +3485,8 @@
           <a:p>
             <a:r>
               <a:rPr lang="en-US" sz="3600" dirty="0" smtClean="0"/>
-              <a:t>Part 7: Find </a:t>
-            </a:r>
-            <a:r>
-              <a:rPr lang="en-US" sz="3600" dirty="0" smtClean="0"/>
-              <a:t>Yield Strength</a:t>
-            </a:r>
-            <a:endParaRPr lang="en-US" sz="3600" dirty="0" smtClean="0"/>
+              <a:t>Part 7: Find Yield Strength</a:t>
+            </a:r>
           </a:p>
         </p:txBody>
       </p:sp>
@@ -3518,6 +3494,88 @@
     <p:extLst>
       <p:ext uri="{BB962C8B-B14F-4D97-AF65-F5344CB8AC3E}">
         <p14:creationId xmlns:p14="http://schemas.microsoft.com/office/powerpoint/2010/main" val="3022610846"/>
+      </p:ext>
+    </p:extLst>
+  </p:cSld>
+  <p:clrMapOvr>
+    <a:masterClrMapping/>
+  </p:clrMapOvr>
+</p:sld>
+</file>
+
+<file path=ppt/slides/slide8.xml><?xml version="1.0" encoding="utf-8"?>
+<p:sld xmlns:a="http://schemas.openxmlformats.org/drawingml/2006/main" xmlns:r="http://schemas.openxmlformats.org/officeDocument/2006/relationships" xmlns:p="http://schemas.openxmlformats.org/presentationml/2006/main">
+  <p:cSld>
+    <p:spTree>
+      <p:nvGrpSpPr>
+        <p:cNvPr id="1" name=""/>
+        <p:cNvGrpSpPr/>
+        <p:nvPr/>
+      </p:nvGrpSpPr>
+      <p:grpSpPr>
+        <a:xfrm>
+          <a:off x="0" y="0"/>
+          <a:ext cx="0" cy="0"/>
+          <a:chOff x="0" y="0"/>
+          <a:chExt cx="0" cy="0"/>
+        </a:xfrm>
+      </p:grpSpPr>
+      <p:sp>
+        <p:nvSpPr>
+          <p:cNvPr id="2" name="Title 1"/>
+          <p:cNvSpPr>
+            <a:spLocks noGrp="1"/>
+          </p:cNvSpPr>
+          <p:nvPr>
+            <p:ph type="ctrTitle"/>
+          </p:nvPr>
+        </p:nvSpPr>
+        <p:spPr/>
+        <p:txBody>
+          <a:bodyPr/>
+          <a:lstStyle/>
+          <a:p>
+            <a:r>
+              <a:rPr lang="en-US" sz="7200" dirty="0" smtClean="0"/>
+              <a:t>Lab 6</a:t>
+            </a:r>
+            <a:endParaRPr lang="en-US" dirty="0"/>
+          </a:p>
+        </p:txBody>
+      </p:sp>
+      <p:sp>
+        <p:nvSpPr>
+          <p:cNvPr id="3" name="Subtitle 2"/>
+          <p:cNvSpPr>
+            <a:spLocks noGrp="1"/>
+          </p:cNvSpPr>
+          <p:nvPr>
+            <p:ph type="subTitle" idx="1"/>
+          </p:nvPr>
+        </p:nvSpPr>
+        <p:spPr/>
+        <p:txBody>
+          <a:bodyPr>
+            <a:normAutofit/>
+          </a:bodyPr>
+          <a:lstStyle/>
+          <a:p>
+            <a:r>
+              <a:rPr lang="en-US" sz="3600" dirty="0" smtClean="0"/>
+              <a:t>Part </a:t>
+            </a:r>
+            <a:r>
+              <a:rPr lang="en-US" sz="3600" dirty="0" smtClean="0"/>
+              <a:t>8*: Bonus – Find Yield Strength Programmatically</a:t>
+            </a:r>
+            <a:endParaRPr lang="en-US" sz="3600" dirty="0" smtClean="0"/>
+          </a:p>
+        </p:txBody>
+      </p:sp>
+    </p:spTree>
+    <p:extLst>
+      <p:ext uri="{BB962C8B-B14F-4D97-AF65-F5344CB8AC3E}">
+        <p14:creationId xmlns:p14="http://schemas.microsoft.com/office/powerpoint/2010/main" val="283599704"/>
       </p:ext>
     </p:extLst>
   </p:cSld>

</xml_diff>